<commit_message>
Videos of session1 added
</commit_message>
<xml_diff>
--- a/DeepLearning-Intro-05.pptx
+++ b/DeepLearning-Intro-05.pptx
@@ -5,48 +5,47 @@
     <p:sldMasterId id="2147483684" r:id="rId1"/>
   </p:sldMasterIdLst>
   <p:notesMasterIdLst>
-    <p:notesMasterId r:id="rId18"/>
+    <p:notesMasterId r:id="rId17"/>
   </p:notesMasterIdLst>
   <p:sldIdLst>
     <p:sldId id="311" r:id="rId2"/>
     <p:sldId id="287" r:id="rId3"/>
     <p:sldId id="298" r:id="rId4"/>
-    <p:sldId id="299" r:id="rId5"/>
-    <p:sldId id="300" r:id="rId6"/>
-    <p:sldId id="302" r:id="rId7"/>
-    <p:sldId id="305" r:id="rId8"/>
-    <p:sldId id="289" r:id="rId9"/>
-    <p:sldId id="290" r:id="rId10"/>
-    <p:sldId id="291" r:id="rId11"/>
-    <p:sldId id="293" r:id="rId12"/>
-    <p:sldId id="294" r:id="rId13"/>
-    <p:sldId id="295" r:id="rId14"/>
-    <p:sldId id="296" r:id="rId15"/>
-    <p:sldId id="307" r:id="rId16"/>
-    <p:sldId id="310" r:id="rId17"/>
+    <p:sldId id="300" r:id="rId5"/>
+    <p:sldId id="302" r:id="rId6"/>
+    <p:sldId id="305" r:id="rId7"/>
+    <p:sldId id="289" r:id="rId8"/>
+    <p:sldId id="290" r:id="rId9"/>
+    <p:sldId id="291" r:id="rId10"/>
+    <p:sldId id="293" r:id="rId11"/>
+    <p:sldId id="294" r:id="rId12"/>
+    <p:sldId id="295" r:id="rId13"/>
+    <p:sldId id="296" r:id="rId14"/>
+    <p:sldId id="307" r:id="rId15"/>
+    <p:sldId id="310" r:id="rId16"/>
   </p:sldIdLst>
   <p:sldSz cx="9144000" cy="5143500" type="screen16x9"/>
   <p:notesSz cx="6858000" cy="9144000"/>
   <p:embeddedFontLst>
     <p:embeddedFont>
-      <p:font typeface="B Mitra" panose="00000400000000000000" pitchFamily="2" charset="-78"/>
-      <p:regular r:id="rId19"/>
-      <p:bold r:id="rId20"/>
+      <p:font typeface="Franklin Gothic Book" panose="020B0503020102020204" pitchFamily="34" charset="0"/>
+      <p:regular r:id="rId18"/>
+      <p:italic r:id="rId19"/>
     </p:embeddedFont>
     <p:embeddedFont>
-      <p:font typeface="Franklin Gothic Book" panose="020B0503020102020204" pitchFamily="34" charset="0"/>
-      <p:regular r:id="rId21"/>
-      <p:italic r:id="rId22"/>
+      <p:font typeface="Tahoma" panose="020B0604030504040204" pitchFamily="34" charset="0"/>
+      <p:regular r:id="rId20"/>
+      <p:bold r:id="rId21"/>
     </p:embeddedFont>
     <p:embeddedFont>
       <p:font typeface="B Nazanin" panose="00000400000000000000" pitchFamily="2" charset="-78"/>
-      <p:regular r:id="rId23"/>
-      <p:bold r:id="rId24"/>
+      <p:regular r:id="rId22"/>
+      <p:bold r:id="rId23"/>
     </p:embeddedFont>
     <p:embeddedFont>
-      <p:font typeface="Tahoma" panose="020B0604030504040204" pitchFamily="34" charset="0"/>
-      <p:regular r:id="rId25"/>
-      <p:bold r:id="rId26"/>
+      <p:font typeface="B Mitra" panose="00000400000000000000" pitchFamily="2" charset="-78"/>
+      <p:regular r:id="rId24"/>
+      <p:bold r:id="rId25"/>
     </p:embeddedFont>
   </p:embeddedFontLst>
   <p:defaultTextStyle>
@@ -250,7 +249,7 @@
             <a:fld id="{CF9B6FA1-485B-4096-870B-7A0ABBBA3EAC}" type="datetimeFigureOut">
               <a:rPr lang="en-US" smtClean="0"/>
               <a:pPr/>
-              <a:t>2019-12-30</a:t>
+              <a:t>2020-01-06</a:t>
             </a:fld>
             <a:endParaRPr lang="en-US" dirty="0"/>
           </a:p>
@@ -693,7 +692,7 @@
             <a:fld id="{B3EA30DF-95FD-405E-BFBA-4B9C8B464E32}" type="datetime1">
               <a:rPr lang="en-US" smtClean="0"/>
               <a:pPr/>
-              <a:t>2019-12-30</a:t>
+              <a:t>2020-01-06</a:t>
             </a:fld>
             <a:endParaRPr lang="en-US" dirty="0"/>
           </a:p>
@@ -1025,7 +1024,7 @@
             <a:fld id="{F1C8D616-20C4-4F23-A64C-0691E2A31EAF}" type="datetime1">
               <a:rPr lang="en-US" smtClean="0"/>
               <a:pPr/>
-              <a:t>2019-12-30</a:t>
+              <a:t>2020-01-06</a:t>
             </a:fld>
             <a:endParaRPr lang="en-US" dirty="0"/>
           </a:p>
@@ -1207,7 +1206,7 @@
             <a:fld id="{A972E606-61D9-45EB-AAFD-97F53E94FD31}" type="datetime1">
               <a:rPr lang="en-US" smtClean="0"/>
               <a:pPr/>
-              <a:t>2019-12-30</a:t>
+              <a:t>2020-01-06</a:t>
             </a:fld>
             <a:endParaRPr lang="en-US" dirty="0"/>
           </a:p>
@@ -1556,7 +1555,7 @@
             <a:fld id="{3C06EC05-0FC6-4B3E-A0BB-503147EBAFC7}" type="datetime1">
               <a:rPr lang="en-US" smtClean="0"/>
               <a:pPr/>
-              <a:t>2019-12-30</a:t>
+              <a:t>2020-01-06</a:t>
             </a:fld>
             <a:endParaRPr lang="en-US" dirty="0"/>
           </a:p>
@@ -1842,7 +1841,7 @@
             <a:fld id="{D29DD2DE-8319-4156-9997-5E3FC01F2440}" type="datetime1">
               <a:rPr lang="en-US" smtClean="0"/>
               <a:pPr/>
-              <a:t>2019-12-30</a:t>
+              <a:t>2020-01-06</a:t>
             </a:fld>
             <a:endParaRPr lang="en-US" dirty="0"/>
           </a:p>
@@ -2238,7 +2237,7 @@
             <a:fld id="{34DAEE71-3A41-4514-ACCA-8E63BA20673B}" type="datetime1">
               <a:rPr lang="en-US" smtClean="0"/>
               <a:pPr/>
-              <a:t>2019-12-30</a:t>
+              <a:t>2020-01-06</a:t>
             </a:fld>
             <a:endParaRPr lang="en-US" dirty="0"/>
           </a:p>
@@ -2717,7 +2716,7 @@
             <a:fld id="{43697F31-8722-459B-8A84-F10AFAC348D1}" type="datetime1">
               <a:rPr lang="en-US" smtClean="0"/>
               <a:pPr/>
-              <a:t>2019-12-30</a:t>
+              <a:t>2020-01-06</a:t>
             </a:fld>
             <a:endParaRPr lang="en-US" dirty="0"/>
           </a:p>
@@ -2837,7 +2836,7 @@
             <a:fld id="{A83EA3D9-6F54-4710-8191-92B18C1A907C}" type="datetime1">
               <a:rPr lang="en-US" smtClean="0"/>
               <a:pPr/>
-              <a:t>2019-12-30</a:t>
+              <a:t>2020-01-06</a:t>
             </a:fld>
             <a:endParaRPr lang="en-US" dirty="0"/>
           </a:p>
@@ -2934,7 +2933,7 @@
             <a:fld id="{F6488192-14B8-4647-A12D-F18B5E551158}" type="datetime1">
               <a:rPr lang="en-US" smtClean="0"/>
               <a:pPr/>
-              <a:t>2019-12-30</a:t>
+              <a:t>2020-01-06</a:t>
             </a:fld>
             <a:endParaRPr lang="en-US" dirty="0"/>
           </a:p>
@@ -3282,7 +3281,7 @@
             <a:fld id="{7E2A289E-2E50-48E9-82D6-BDF548121AE1}" type="datetime1">
               <a:rPr lang="en-US" smtClean="0"/>
               <a:pPr/>
-              <a:t>2019-12-30</a:t>
+              <a:t>2020-01-06</a:t>
             </a:fld>
             <a:endParaRPr lang="en-US" dirty="0"/>
           </a:p>
@@ -3684,7 +3683,7 @@
             <a:fld id="{9CA9AB57-7A2D-495B-A8DE-4CAD9D13607C}" type="datetime1">
               <a:rPr lang="en-US" smtClean="0"/>
               <a:pPr/>
-              <a:t>2019-12-30</a:t>
+              <a:t>2020-01-06</a:t>
             </a:fld>
             <a:endParaRPr lang="en-US" dirty="0"/>
           </a:p>
@@ -3965,7 +3964,7 @@
             <a:fld id="{3C8A2DE5-286A-48A8-AD5B-867309DD8C54}" type="datetime1">
               <a:rPr lang="en-US" smtClean="0"/>
               <a:pPr defTabSz="457200"/>
-              <a:t>2019-12-30</a:t>
+              <a:t>2020-01-06</a:t>
             </a:fld>
             <a:endParaRPr lang="en-US" dirty="0"/>
           </a:p>
@@ -4833,10 +4832,15 @@
             <p:ph idx="1"/>
           </p:nvPr>
         </p:nvSpPr>
-        <p:spPr/>
+        <p:spPr>
+          <a:xfrm>
+            <a:off x="762000" y="1200151"/>
+            <a:ext cx="7924800" cy="3394472"/>
+          </a:xfrm>
+        </p:spPr>
         <p:txBody>
           <a:bodyPr>
-            <a:normAutofit lnSpcReduction="10000"/>
+            <a:normAutofit/>
           </a:bodyPr>
           <a:lstStyle/>
           <a:p>
@@ -4851,31 +4855,7 @@
                   <a:srgbClr val="002060"/>
                 </a:solidFill>
               </a:rPr>
-              <a:t>دوره یادگیری عمیق (</a:t>
-            </a:r>
-            <a:r>
-              <a:rPr lang="en-US" sz="2400" dirty="0">
-                <a:solidFill>
-                  <a:srgbClr val="002060"/>
-                </a:solidFill>
-              </a:rPr>
-              <a:t>Richard </a:t>
-            </a:r>
-            <a:r>
-              <a:rPr lang="en-US" sz="2400" dirty="0" err="1">
-                <a:solidFill>
-                  <a:srgbClr val="002060"/>
-                </a:solidFill>
-              </a:rPr>
-              <a:t>Socher</a:t>
-            </a:r>
-            <a:r>
-              <a:rPr lang="fa-IR" sz="2800" dirty="0" smtClean="0">
-                <a:solidFill>
-                  <a:srgbClr val="002060"/>
-                </a:solidFill>
-              </a:rPr>
-              <a:t>)</a:t>
+              <a:t>دوره یادگیری ماشین و یادگیری عمیق</a:t>
             </a:r>
           </a:p>
           <a:p>
@@ -4892,7 +4872,7 @@
                 </a:solidFill>
                 <a:hlinkClick r:id="rId2"/>
               </a:rPr>
-              <a:t>https://cs224d.stanford.edu</a:t>
+              <a:t>http://</a:t>
             </a:r>
             <a:r>
               <a:rPr lang="en-US" sz="2400" dirty="0" smtClean="0">
@@ -4901,236 +4881,13 @@
                 </a:solidFill>
                 <a:hlinkClick r:id="rId2"/>
               </a:rPr>
-              <a:t>/</a:t>
+              <a:t>ufldl.stanford.edu/tutorial/</a:t>
             </a:r>
             <a:endParaRPr lang="en-US" sz="2400" dirty="0" smtClean="0">
               <a:solidFill>
                 <a:srgbClr val="002060"/>
               </a:solidFill>
             </a:endParaRPr>
-          </a:p>
-          <a:p>
-            <a:pPr algn="r" rtl="1">
-              <a:lnSpc>
-                <a:spcPct val="150000"/>
-              </a:lnSpc>
-            </a:pPr>
-            <a:r>
-              <a:rPr lang="fa-IR" sz="2400" dirty="0" smtClean="0">
-                <a:solidFill>
-                  <a:srgbClr val="002060"/>
-                </a:solidFill>
-              </a:rPr>
-              <a:t>تمرکز بر پردازش زبان طبیعی (</a:t>
-            </a:r>
-            <a:r>
-              <a:rPr lang="en-US" sz="2000" dirty="0" smtClean="0">
-                <a:solidFill>
-                  <a:srgbClr val="002060"/>
-                </a:solidFill>
-              </a:rPr>
-              <a:t>NLP</a:t>
-            </a:r>
-            <a:r>
-              <a:rPr lang="fa-IR" sz="2400" dirty="0" smtClean="0">
-                <a:solidFill>
-                  <a:srgbClr val="002060"/>
-                </a:solidFill>
-              </a:rPr>
-              <a:t>)</a:t>
-            </a:r>
-          </a:p>
-          <a:p>
-            <a:pPr algn="r" rtl="1">
-              <a:lnSpc>
-                <a:spcPct val="150000"/>
-              </a:lnSpc>
-            </a:pPr>
-            <a:r>
-              <a:rPr lang="fa-IR" sz="2400" dirty="0" smtClean="0">
-                <a:solidFill>
-                  <a:srgbClr val="002060"/>
-                </a:solidFill>
-              </a:rPr>
-              <a:t>آموزش کدنویسی با </a:t>
-            </a:r>
-            <a:r>
-              <a:rPr lang="en-US" sz="2000" dirty="0" err="1" smtClean="0">
-                <a:solidFill>
-                  <a:srgbClr val="002060"/>
-                </a:solidFill>
-              </a:rPr>
-              <a:t>Tensorflow</a:t>
-            </a:r>
-            <a:endParaRPr lang="en-US" sz="2400" dirty="0">
-              <a:solidFill>
-                <a:srgbClr val="002060"/>
-              </a:solidFill>
-            </a:endParaRPr>
-          </a:p>
-        </p:txBody>
-      </p:sp>
-      <p:sp>
-        <p:nvSpPr>
-          <p:cNvPr id="4" name="Slide Number Placeholder 3"/>
-          <p:cNvSpPr>
-            <a:spLocks noGrp="1"/>
-          </p:cNvSpPr>
-          <p:nvPr>
-            <p:ph type="sldNum" sz="quarter" idx="12"/>
-          </p:nvPr>
-        </p:nvSpPr>
-        <p:spPr/>
-        <p:txBody>
-          <a:bodyPr/>
-          <a:lstStyle/>
-          <a:p>
-            <a:fld id="{629637A9-119A-49DA-BD12-AAC58B377D80}" type="slidenum">
-              <a:rPr lang="en-US" smtClean="0"/>
-              <a:pPr/>
-              <a:t>10</a:t>
-            </a:fld>
-            <a:endParaRPr lang="en-US" dirty="0"/>
-          </a:p>
-        </p:txBody>
-      </p:sp>
-      <p:pic>
-        <p:nvPicPr>
-          <p:cNvPr id="7" name="Picture 6"/>
-          <p:cNvPicPr>
-            <a:picLocks noChangeAspect="1"/>
-          </p:cNvPicPr>
-          <p:nvPr/>
-        </p:nvPicPr>
-        <p:blipFill>
-          <a:blip r:embed="rId3" cstate="email">
-            <a:clrChange>
-              <a:clrFrom>
-                <a:srgbClr val="FFFFFF"/>
-              </a:clrFrom>
-              <a:clrTo>
-                <a:srgbClr val="FFFFFF">
-                  <a:alpha val="0"/>
-                </a:srgbClr>
-              </a:clrTo>
-            </a:clrChange>
-            <a:extLst>
-              <a:ext uri="{28A0092B-C50C-407E-A947-70E740481C1C}">
-                <a14:useLocalDpi xmlns:a14="http://schemas.microsoft.com/office/drawing/2010/main"/>
-              </a:ext>
-            </a:extLst>
-          </a:blip>
-          <a:stretch>
-            <a:fillRect/>
-          </a:stretch>
-        </p:blipFill>
-        <p:spPr>
-          <a:xfrm>
-            <a:off x="533400" y="3754078"/>
-            <a:ext cx="2819400" cy="1233488"/>
-          </a:xfrm>
-          <a:prstGeom prst="rect">
-            <a:avLst/>
-          </a:prstGeom>
-        </p:spPr>
-      </p:pic>
-    </p:spTree>
-    <p:extLst>
-      <p:ext uri="{BB962C8B-B14F-4D97-AF65-F5344CB8AC3E}">
-        <p14:creationId xmlns:p14="http://schemas.microsoft.com/office/powerpoint/2010/main" val="2737061400"/>
-      </p:ext>
-    </p:extLst>
-  </p:cSld>
-  <p:clrMapOvr>
-    <a:masterClrMapping/>
-  </p:clrMapOvr>
-  <p:timing>
-    <p:tnLst>
-      <p:par>
-        <p:cTn id="1" dur="indefinite" restart="never" nodeType="tmRoot"/>
-      </p:par>
-    </p:tnLst>
-  </p:timing>
-</p:sld>
-</file>
-
-<file path=ppt/slides/slide11.xml><?xml version="1.0" encoding="utf-8"?>
-<p:sld xmlns:a="http://schemas.openxmlformats.org/drawingml/2006/main" xmlns:r="http://schemas.openxmlformats.org/officeDocument/2006/relationships" xmlns:p="http://schemas.openxmlformats.org/presentationml/2006/main">
-  <p:cSld>
-    <p:spTree>
-      <p:nvGrpSpPr>
-        <p:cNvPr id="1" name=""/>
-        <p:cNvGrpSpPr/>
-        <p:nvPr/>
-      </p:nvGrpSpPr>
-      <p:grpSpPr>
-        <a:xfrm>
-          <a:off x="0" y="0"/>
-          <a:ext cx="0" cy="0"/>
-          <a:chOff x="0" y="0"/>
-          <a:chExt cx="0" cy="0"/>
-        </a:xfrm>
-      </p:grpSpPr>
-      <p:sp>
-        <p:nvSpPr>
-          <p:cNvPr id="2" name="Title 1"/>
-          <p:cNvSpPr>
-            <a:spLocks noGrp="1"/>
-          </p:cNvSpPr>
-          <p:nvPr>
-            <p:ph type="title"/>
-          </p:nvPr>
-        </p:nvSpPr>
-        <p:spPr/>
-        <p:txBody>
-          <a:bodyPr>
-            <a:normAutofit/>
-          </a:bodyPr>
-          <a:lstStyle/>
-          <a:p>
-            <a:r>
-              <a:rPr lang="fa-IR" sz="2800" b="1" dirty="0" smtClean="0"/>
-              <a:t>دانشگاه استنفورد</a:t>
-            </a:r>
-            <a:endParaRPr lang="en-US" sz="2800" b="1" dirty="0"/>
-          </a:p>
-        </p:txBody>
-      </p:sp>
-      <p:sp>
-        <p:nvSpPr>
-          <p:cNvPr id="3" name="Content Placeholder 2"/>
-          <p:cNvSpPr>
-            <a:spLocks noGrp="1"/>
-          </p:cNvSpPr>
-          <p:nvPr>
-            <p:ph idx="1"/>
-          </p:nvPr>
-        </p:nvSpPr>
-        <p:spPr>
-          <a:xfrm>
-            <a:off x="762000" y="1200151"/>
-            <a:ext cx="7924800" cy="3394472"/>
-          </a:xfrm>
-        </p:spPr>
-        <p:txBody>
-          <a:bodyPr>
-            <a:normAutofit/>
-          </a:bodyPr>
-          <a:lstStyle/>
-          <a:p>
-            <a:pPr algn="r" rtl="1">
-              <a:lnSpc>
-                <a:spcPct val="150000"/>
-              </a:lnSpc>
-            </a:pPr>
-            <a:r>
-              <a:rPr lang="fa-IR" sz="2800" dirty="0" smtClean="0">
-                <a:solidFill>
-                  <a:srgbClr val="002060"/>
-                </a:solidFill>
-              </a:rPr>
-              <a:t>دوره یادگیری ماشین و یادگیری عمیق</a:t>
-            </a:r>
           </a:p>
           <a:p>
             <a:pPr marL="0" indent="0" algn="l" rtl="0">
@@ -5140,37 +4897,6 @@
               <a:buNone/>
             </a:pPr>
             <a:r>
-              <a:rPr lang="en-US" sz="2400" dirty="0">
-                <a:solidFill>
-                  <a:srgbClr val="002060"/>
-                </a:solidFill>
-                <a:hlinkClick r:id="rId2"/>
-              </a:rPr>
-              <a:t>http://</a:t>
-            </a:r>
-            <a:r>
-              <a:rPr lang="en-US" sz="2400" dirty="0" smtClean="0">
-                <a:solidFill>
-                  <a:srgbClr val="002060"/>
-                </a:solidFill>
-                <a:hlinkClick r:id="rId2"/>
-              </a:rPr>
-              <a:t>ufldl.stanford.edu/tutorial/</a:t>
-            </a:r>
-            <a:endParaRPr lang="en-US" sz="2400" dirty="0" smtClean="0">
-              <a:solidFill>
-                <a:srgbClr val="002060"/>
-              </a:solidFill>
-            </a:endParaRPr>
-          </a:p>
-          <a:p>
-            <a:pPr marL="0" indent="0" algn="l" rtl="0">
-              <a:lnSpc>
-                <a:spcPct val="150000"/>
-              </a:lnSpc>
-              <a:buNone/>
-            </a:pPr>
-            <a:r>
               <a:rPr lang="en-US" sz="2000" dirty="0" err="1" smtClean="0">
                 <a:solidFill>
                   <a:srgbClr val="002060"/>
@@ -5257,7 +4983,7 @@
             <a:fld id="{629637A9-119A-49DA-BD12-AAC58B377D80}" type="slidenum">
               <a:rPr lang="en-US" smtClean="0"/>
               <a:pPr/>
-              <a:t>11</a:t>
+              <a:t>10</a:t>
             </a:fld>
             <a:endParaRPr lang="en-US" dirty="0"/>
           </a:p>
@@ -5323,7 +5049,7 @@
 </p:sld>
 </file>
 
-<file path=ppt/slides/slide12.xml><?xml version="1.0" encoding="utf-8"?>
+<file path=ppt/slides/slide11.xml><?xml version="1.0" encoding="utf-8"?>
 <p:sld xmlns:a="http://schemas.openxmlformats.org/drawingml/2006/main" xmlns:r="http://schemas.openxmlformats.org/officeDocument/2006/relationships" xmlns:p="http://schemas.openxmlformats.org/presentationml/2006/main">
   <p:cSld>
     <p:spTree>
@@ -5389,11 +5115,7 @@
             </a:pPr>
             <a:r>
               <a:rPr lang="fa-IR" sz="2800" dirty="0" smtClean="0"/>
-              <a:t>آموزش جامع یادگیری </a:t>
-            </a:r>
-            <a:r>
-              <a:rPr lang="fa-IR" sz="2800" dirty="0" smtClean="0"/>
-              <a:t>عمیق</a:t>
+              <a:t>آموزش جامع یادگیری عمیق</a:t>
             </a:r>
             <a:br>
               <a:rPr lang="fa-IR" sz="2800" dirty="0" smtClean="0"/>
@@ -5402,7 +5124,6 @@
               <a:rPr lang="fa-IR" sz="2000" dirty="0" smtClean="0"/>
               <a:t>دوره کارشناسی ارشد دانشگاه آمستردام</a:t>
             </a:r>
-            <a:endParaRPr lang="fa-IR" sz="2000" dirty="0" smtClean="0"/>
           </a:p>
           <a:p>
             <a:pPr marL="0" indent="0" algn="l" rtl="0">
@@ -5470,7 +5191,7 @@
             <a:fld id="{629637A9-119A-49DA-BD12-AAC58B377D80}" type="slidenum">
               <a:rPr lang="en-US" smtClean="0"/>
               <a:pPr/>
-              <a:t>12</a:t>
+              <a:t>11</a:t>
             </a:fld>
             <a:endParaRPr lang="en-US" dirty="0"/>
           </a:p>
@@ -5604,7 +5325,7 @@
 </p:sld>
 </file>
 
-<file path=ppt/slides/slide13.xml><?xml version="1.0" encoding="utf-8"?>
+<file path=ppt/slides/slide12.xml><?xml version="1.0" encoding="utf-8"?>
 <p:sld xmlns:a="http://schemas.openxmlformats.org/drawingml/2006/main" xmlns:r="http://schemas.openxmlformats.org/officeDocument/2006/relationships" xmlns:p="http://schemas.openxmlformats.org/presentationml/2006/main">
   <p:cSld>
     <p:spTree>
@@ -5758,7 +5479,7 @@
             <a:fld id="{629637A9-119A-49DA-BD12-AAC58B377D80}" type="slidenum">
               <a:rPr lang="en-US" smtClean="0"/>
               <a:pPr/>
-              <a:t>13</a:t>
+              <a:t>12</a:t>
             </a:fld>
             <a:endParaRPr lang="en-US" dirty="0"/>
           </a:p>
@@ -5903,7 +5624,7 @@
 </p:sld>
 </file>
 
-<file path=ppt/slides/slide14.xml><?xml version="1.0" encoding="utf-8"?>
+<file path=ppt/slides/slide13.xml><?xml version="1.0" encoding="utf-8"?>
 <p:sld xmlns:a="http://schemas.openxmlformats.org/drawingml/2006/main" xmlns:r="http://schemas.openxmlformats.org/officeDocument/2006/relationships" xmlns:p="http://schemas.openxmlformats.org/presentationml/2006/main">
   <p:cSld>
     <p:spTree>
@@ -6030,7 +5751,15 @@
                   <a:srgbClr val="002060"/>
                 </a:solidFill>
               </a:rPr>
-              <a:t>+ کدنویسی با </a:t>
+              <a:t>+ کدنویسی با پایتون (</a:t>
+            </a:r>
+            <a:r>
+              <a:rPr lang="en-US" sz="2400" dirty="0" err="1" smtClean="0">
+                <a:solidFill>
+                  <a:srgbClr val="002060"/>
+                </a:solidFill>
+              </a:rPr>
+              <a:t>PyTorch</a:t>
             </a:r>
             <a:r>
               <a:rPr lang="fa-IR" sz="2400" dirty="0" smtClean="0">
@@ -6038,29 +5767,8 @@
                   <a:srgbClr val="002060"/>
                 </a:solidFill>
               </a:rPr>
-              <a:t>پایتون (</a:t>
-            </a:r>
-            <a:r>
-              <a:rPr lang="en-US" sz="2400" dirty="0" err="1" smtClean="0">
-                <a:solidFill>
-                  <a:srgbClr val="002060"/>
-                </a:solidFill>
-              </a:rPr>
-              <a:t>PyTorch</a:t>
-            </a:r>
-            <a:r>
-              <a:rPr lang="fa-IR" sz="2400" dirty="0" smtClean="0">
-                <a:solidFill>
-                  <a:srgbClr val="002060"/>
-                </a:solidFill>
-              </a:rPr>
               <a:t>)</a:t>
             </a:r>
-            <a:endParaRPr lang="fa-IR" sz="2400" dirty="0" smtClean="0">
-              <a:solidFill>
-                <a:srgbClr val="002060"/>
-              </a:solidFill>
-            </a:endParaRPr>
           </a:p>
           <a:p>
             <a:pPr algn="r" rtl="1">
@@ -6102,7 +5810,7 @@
             <a:fld id="{629637A9-119A-49DA-BD12-AAC58B377D80}" type="slidenum">
               <a:rPr lang="en-US" smtClean="0"/>
               <a:pPr/>
-              <a:t>14</a:t>
+              <a:t>13</a:t>
             </a:fld>
             <a:endParaRPr lang="en-US" dirty="0"/>
           </a:p>
@@ -6236,7 +5944,7 @@
 </p:sld>
 </file>
 
-<file path=ppt/slides/slide15.xml><?xml version="1.0" encoding="utf-8"?>
+<file path=ppt/slides/slide14.xml><?xml version="1.0" encoding="utf-8"?>
 <p:sld xmlns:a="http://schemas.openxmlformats.org/drawingml/2006/main" xmlns:r="http://schemas.openxmlformats.org/officeDocument/2006/relationships" xmlns:p="http://schemas.openxmlformats.org/presentationml/2006/main">
   <p:cSld>
     <p:spTree>
@@ -6311,23 +6019,7 @@
                   <a:srgbClr val="002060"/>
                 </a:solidFill>
               </a:rPr>
-              <a:t>فهرست </a:t>
-            </a:r>
-            <a:r>
-              <a:rPr lang="fa-IR" sz="2600" dirty="0" smtClean="0">
-                <a:solidFill>
-                  <a:srgbClr val="002060"/>
-                </a:solidFill>
-              </a:rPr>
-              <a:t>مقالات </a:t>
-            </a:r>
-            <a:r>
-              <a:rPr lang="fa-IR" sz="2600" dirty="0" smtClean="0">
-                <a:solidFill>
-                  <a:srgbClr val="002060"/>
-                </a:solidFill>
-              </a:rPr>
-              <a:t>معتبر و رفرنس‌های اصلی حوزه یادگیری عمیق</a:t>
+              <a:t>فهرست مقالات معتبر و رفرنس‌های اصلی حوزه یادگیری عمیق</a:t>
             </a:r>
           </a:p>
           <a:p>
@@ -6364,21 +6056,8 @@
                   <a:srgbClr val="002060"/>
                 </a:solidFill>
               </a:rPr>
-              <a:t>دسته‌بندی </a:t>
-            </a:r>
-            <a:r>
-              <a:rPr lang="fa-IR" sz="2400" dirty="0" smtClean="0">
-                <a:solidFill>
-                  <a:srgbClr val="002060"/>
-                </a:solidFill>
-              </a:rPr>
-              <a:t>موضوعی و به تفکیک سال</a:t>
-            </a:r>
-            <a:endParaRPr lang="fa-IR" sz="2400" dirty="0" smtClean="0">
-              <a:solidFill>
-                <a:srgbClr val="002060"/>
-              </a:solidFill>
-            </a:endParaRPr>
+              <a:t>دسته‌بندی موضوعی و به تفکیک سال</a:t>
+            </a:r>
           </a:p>
           <a:p>
             <a:pPr algn="r" rtl="1">
@@ -6444,7 +6123,7 @@
             <a:fld id="{629637A9-119A-49DA-BD12-AAC58B377D80}" type="slidenum">
               <a:rPr lang="en-US" smtClean="0"/>
               <a:pPr/>
-              <a:t>15</a:t>
+              <a:t>14</a:t>
             </a:fld>
             <a:endParaRPr lang="en-US" dirty="0"/>
           </a:p>
@@ -6470,7 +6149,7 @@
 </p:sld>
 </file>
 
-<file path=ppt/slides/slide16.xml><?xml version="1.0" encoding="utf-8"?>
+<file path=ppt/slides/slide15.xml><?xml version="1.0" encoding="utf-8"?>
 <p:sld xmlns:a="http://schemas.openxmlformats.org/drawingml/2006/main" xmlns:r="http://schemas.openxmlformats.org/officeDocument/2006/relationships" xmlns:p="http://schemas.openxmlformats.org/presentationml/2006/main">
   <p:cSld>
     <p:spTree>
@@ -6537,7 +6216,7 @@
             <a:fld id="{629637A9-119A-49DA-BD12-AAC58B377D80}" type="slidenum">
               <a:rPr lang="en-US" smtClean="0"/>
               <a:pPr/>
-              <a:t>16</a:t>
+              <a:t>15</a:t>
             </a:fld>
             <a:endParaRPr lang="en-US" dirty="0"/>
           </a:p>
@@ -6814,11 +6493,6 @@
               </a:rPr>
               <a:t>معتبر</a:t>
             </a:r>
-            <a:endParaRPr lang="fa-IR" sz="2400" dirty="0" smtClean="0">
-              <a:solidFill>
-                <a:srgbClr val="002060"/>
-              </a:solidFill>
-            </a:endParaRPr>
           </a:p>
           <a:p>
             <a:pPr algn="r" rtl="1">
@@ -6832,15 +6506,7 @@
                   <a:srgbClr val="002060"/>
                 </a:solidFill>
               </a:rPr>
-              <a:t>دوره‌های </a:t>
-            </a:r>
-            <a:r>
-              <a:rPr lang="fa-IR" sz="2400" dirty="0" smtClean="0">
-                <a:solidFill>
-                  <a:srgbClr val="002060"/>
-                </a:solidFill>
-              </a:rPr>
-              <a:t>آموزشی دانشگاه‌های معتبر</a:t>
+              <a:t>دوره‌های آموزشی دانشگاه‌های معتبر</a:t>
             </a:r>
           </a:p>
           <a:p>
@@ -6855,23 +6521,7 @@
                   <a:srgbClr val="002060"/>
                 </a:solidFill>
               </a:rPr>
-              <a:t>مقالات </a:t>
-            </a:r>
-            <a:r>
-              <a:rPr lang="fa-IR" sz="2400" dirty="0" smtClean="0">
-                <a:solidFill>
-                  <a:srgbClr val="002060"/>
-                </a:solidFill>
-              </a:rPr>
-              <a:t>معتبر حوزه یادگیری </a:t>
-            </a:r>
-            <a:r>
-              <a:rPr lang="fa-IR" sz="2400" dirty="0" smtClean="0">
-                <a:solidFill>
-                  <a:srgbClr val="002060"/>
-                </a:solidFill>
-              </a:rPr>
-              <a:t>عمیق</a:t>
+              <a:t>مقالات معتبر حوزه یادگیری عمیق</a:t>
             </a:r>
             <a:endParaRPr lang="fa-IR" sz="2400" dirty="0">
               <a:solidFill>
@@ -6996,7 +6646,15 @@
                   <a:srgbClr val="002060"/>
                 </a:solidFill>
               </a:rPr>
-              <a:t>آموزش ویدیویی </a:t>
+              <a:t>آموزش ویدیویی رایگان (</a:t>
+            </a:r>
+            <a:r>
+              <a:rPr lang="en-US" sz="2400" dirty="0" smtClean="0">
+                <a:solidFill>
+                  <a:srgbClr val="002060"/>
+                </a:solidFill>
+              </a:rPr>
+              <a:t>audit</a:t>
             </a:r>
             <a:r>
               <a:rPr lang="fa-IR" sz="2400" dirty="0" smtClean="0">
@@ -7004,29 +6662,8 @@
                   <a:srgbClr val="002060"/>
                 </a:solidFill>
               </a:rPr>
-              <a:t>رایگان (</a:t>
-            </a:r>
-            <a:r>
-              <a:rPr lang="en-US" sz="2400" dirty="0" smtClean="0">
-                <a:solidFill>
-                  <a:srgbClr val="002060"/>
-                </a:solidFill>
-              </a:rPr>
-              <a:t>audit</a:t>
-            </a:r>
-            <a:r>
-              <a:rPr lang="fa-IR" sz="2400" dirty="0" smtClean="0">
-                <a:solidFill>
-                  <a:srgbClr val="002060"/>
-                </a:solidFill>
-              </a:rPr>
               <a:t>)</a:t>
             </a:r>
-            <a:endParaRPr lang="fa-IR" sz="2400" dirty="0" smtClean="0">
-              <a:solidFill>
-                <a:srgbClr val="002060"/>
-              </a:solidFill>
-            </a:endParaRPr>
           </a:p>
           <a:p>
             <a:pPr algn="r" rtl="1">
@@ -7055,15 +6692,7 @@
                   <a:srgbClr val="002060"/>
                 </a:solidFill>
               </a:rPr>
-              <a:t>اپلیکیشن </a:t>
-            </a:r>
-            <a:r>
-              <a:rPr lang="fa-IR" sz="2400" dirty="0" smtClean="0">
-                <a:solidFill>
-                  <a:srgbClr val="002060"/>
-                </a:solidFill>
-              </a:rPr>
-              <a:t>موبایل</a:t>
+              <a:t>اپلیکیشن موبایل</a:t>
             </a:r>
             <a:endParaRPr lang="en-US" sz="2400" dirty="0">
               <a:solidFill>
@@ -7329,368 +6958,6 @@
         </p:nvSpPr>
         <p:spPr>
           <a:xfrm>
-            <a:off x="1371600" y="1200150"/>
-            <a:ext cx="7200900" cy="2686050"/>
-          </a:xfrm>
-        </p:spPr>
-        <p:txBody>
-          <a:bodyPr>
-            <a:normAutofit fontScale="92500" lnSpcReduction="10000"/>
-          </a:bodyPr>
-          <a:lstStyle/>
-          <a:p>
-            <a:pPr algn="r" rtl="1"/>
-            <a:r>
-              <a:rPr lang="fa-IR" sz="2400" dirty="0" smtClean="0">
-                <a:solidFill>
-                  <a:srgbClr val="002060"/>
-                </a:solidFill>
-              </a:rPr>
-              <a:t>دوره یادگیری ماشین </a:t>
-            </a:r>
-            <a:r>
-              <a:rPr lang="en-US" sz="2400" dirty="0" smtClean="0">
-                <a:solidFill>
-                  <a:srgbClr val="002060"/>
-                </a:solidFill>
-              </a:rPr>
-              <a:t>(</a:t>
-            </a:r>
-            <a:r>
-              <a:rPr lang="en-US" sz="2000" dirty="0" smtClean="0">
-                <a:solidFill>
-                  <a:srgbClr val="002060"/>
-                </a:solidFill>
-              </a:rPr>
-              <a:t>Andrew Ng</a:t>
-            </a:r>
-            <a:r>
-              <a:rPr lang="en-US" sz="2400" dirty="0" smtClean="0">
-                <a:solidFill>
-                  <a:srgbClr val="002060"/>
-                </a:solidFill>
-              </a:rPr>
-              <a:t>)</a:t>
-            </a:r>
-          </a:p>
-          <a:p>
-            <a:pPr marL="0" indent="0" algn="r" rtl="1">
-              <a:buNone/>
-            </a:pPr>
-            <a:r>
-              <a:rPr lang="en-US" sz="2400" dirty="0">
-                <a:solidFill>
-                  <a:srgbClr val="002060"/>
-                </a:solidFill>
-                <a:hlinkClick r:id="rId2"/>
-              </a:rPr>
-              <a:t>https://</a:t>
-            </a:r>
-            <a:r>
-              <a:rPr lang="en-US" sz="2400" dirty="0" smtClean="0">
-                <a:solidFill>
-                  <a:srgbClr val="002060"/>
-                </a:solidFill>
-                <a:hlinkClick r:id="rId2"/>
-              </a:rPr>
-              <a:t>www.coursera.org/learn/machine-learning</a:t>
-            </a:r>
-            <a:endParaRPr lang="en-US" sz="2400" dirty="0" smtClean="0">
-              <a:solidFill>
-                <a:srgbClr val="002060"/>
-              </a:solidFill>
-            </a:endParaRPr>
-          </a:p>
-          <a:p>
-            <a:pPr algn="r" rtl="1">
-              <a:lnSpc>
-                <a:spcPct val="150000"/>
-              </a:lnSpc>
-            </a:pPr>
-            <a:r>
-              <a:rPr lang="fa-IR" sz="2400" dirty="0" smtClean="0">
-                <a:solidFill>
-                  <a:srgbClr val="002060"/>
-                </a:solidFill>
-              </a:rPr>
-              <a:t>دوره شبکه‌های عصبی (</a:t>
-            </a:r>
-            <a:r>
-              <a:rPr lang="en-US" sz="2000" dirty="0">
-                <a:solidFill>
-                  <a:srgbClr val="002060"/>
-                </a:solidFill>
-              </a:rPr>
-              <a:t>Geoffrey Hinton</a:t>
-            </a:r>
-            <a:r>
-              <a:rPr lang="fa-IR" sz="2400" dirty="0" smtClean="0">
-                <a:solidFill>
-                  <a:srgbClr val="002060"/>
-                </a:solidFill>
-              </a:rPr>
-              <a:t>)</a:t>
-            </a:r>
-          </a:p>
-          <a:p>
-            <a:pPr marL="0" indent="0" algn="r" rtl="1">
-              <a:buNone/>
-            </a:pPr>
-            <a:r>
-              <a:rPr lang="en-US" sz="2400" dirty="0">
-                <a:solidFill>
-                  <a:srgbClr val="002060"/>
-                </a:solidFill>
-                <a:hlinkClick r:id="rId3"/>
-              </a:rPr>
-              <a:t>https://www.coursera.org/learn/neural-networks</a:t>
-            </a:r>
-            <a:endParaRPr lang="en-US" sz="2400" dirty="0">
-              <a:solidFill>
-                <a:srgbClr val="002060"/>
-              </a:solidFill>
-            </a:endParaRPr>
-          </a:p>
-          <a:p>
-            <a:pPr algn="r" rtl="1"/>
-            <a:r>
-              <a:rPr lang="fa-IR" sz="2400" dirty="0" smtClean="0">
-                <a:solidFill>
-                  <a:srgbClr val="002060"/>
-                </a:solidFill>
-              </a:rPr>
-              <a:t>زبان </a:t>
-            </a:r>
-            <a:r>
-              <a:rPr lang="en-US" sz="2400" dirty="0" smtClean="0">
-                <a:solidFill>
-                  <a:srgbClr val="002060"/>
-                </a:solidFill>
-              </a:rPr>
-              <a:t>Python</a:t>
-            </a:r>
-            <a:r>
-              <a:rPr lang="fa-IR" sz="2400" dirty="0" smtClean="0">
-                <a:solidFill>
-                  <a:srgbClr val="002060"/>
-                </a:solidFill>
-              </a:rPr>
-              <a:t> (5 دوره آموزشی)</a:t>
-            </a:r>
-            <a:endParaRPr lang="fa-IR" sz="2400" dirty="0">
-              <a:solidFill>
-                <a:srgbClr val="002060"/>
-              </a:solidFill>
-            </a:endParaRPr>
-          </a:p>
-          <a:p>
-            <a:pPr marL="0" indent="0" algn="r" rtl="1">
-              <a:buNone/>
-            </a:pPr>
-            <a:r>
-              <a:rPr lang="en-US" sz="2400" dirty="0">
-                <a:solidFill>
-                  <a:srgbClr val="002060"/>
-                </a:solidFill>
-                <a:hlinkClick r:id="rId4"/>
-              </a:rPr>
-              <a:t>https://www.coursera.org/specializations/python</a:t>
-            </a:r>
-            <a:endParaRPr lang="en-US" sz="2400" dirty="0">
-              <a:solidFill>
-                <a:srgbClr val="002060"/>
-              </a:solidFill>
-            </a:endParaRPr>
-          </a:p>
-          <a:p>
-            <a:pPr marL="0" indent="0" algn="r" rtl="1">
-              <a:buNone/>
-            </a:pPr>
-            <a:endParaRPr lang="en-US" sz="2400" dirty="0">
-              <a:solidFill>
-                <a:srgbClr val="002060"/>
-              </a:solidFill>
-            </a:endParaRPr>
-          </a:p>
-        </p:txBody>
-      </p:sp>
-      <p:sp>
-        <p:nvSpPr>
-          <p:cNvPr id="4" name="Slide Number Placeholder 3"/>
-          <p:cNvSpPr>
-            <a:spLocks noGrp="1"/>
-          </p:cNvSpPr>
-          <p:nvPr>
-            <p:ph type="sldNum" sz="quarter" idx="12"/>
-          </p:nvPr>
-        </p:nvSpPr>
-        <p:spPr/>
-        <p:txBody>
-          <a:bodyPr/>
-          <a:lstStyle/>
-          <a:p>
-            <a:fld id="{629637A9-119A-49DA-BD12-AAC58B377D80}" type="slidenum">
-              <a:rPr lang="en-US" smtClean="0"/>
-              <a:pPr/>
-              <a:t>4</a:t>
-            </a:fld>
-            <a:endParaRPr lang="en-US" dirty="0"/>
-          </a:p>
-        </p:txBody>
-      </p:sp>
-      <p:grpSp>
-        <p:nvGrpSpPr>
-          <p:cNvPr id="7" name="Group 6"/>
-          <p:cNvGrpSpPr/>
-          <p:nvPr/>
-        </p:nvGrpSpPr>
-        <p:grpSpPr>
-          <a:xfrm>
-            <a:off x="838200" y="4154742"/>
-            <a:ext cx="2607942" cy="685800"/>
-            <a:chOff x="228600" y="4214587"/>
-            <a:chExt cx="2607942" cy="685800"/>
-          </a:xfrm>
-        </p:grpSpPr>
-        <p:pic>
-          <p:nvPicPr>
-            <p:cNvPr id="6" name="Picture 5"/>
-            <p:cNvPicPr>
-              <a:picLocks noChangeAspect="1"/>
-            </p:cNvPicPr>
-            <p:nvPr/>
-          </p:nvPicPr>
-          <p:blipFill rotWithShape="1">
-            <a:blip r:embed="rId5" cstate="print">
-              <a:extLst>
-                <a:ext uri="{28A0092B-C50C-407E-A947-70E740481C1C}">
-                  <a14:useLocalDpi xmlns:a14="http://schemas.microsoft.com/office/drawing/2010/main" val="0"/>
-                </a:ext>
-              </a:extLst>
-            </a:blip>
-            <a:srcRect/>
-            <a:stretch/>
-          </p:blipFill>
-          <p:spPr>
-            <a:xfrm>
-              <a:off x="925688" y="4243257"/>
-              <a:ext cx="1910854" cy="645841"/>
-            </a:xfrm>
-            <a:prstGeom prst="rect">
-              <a:avLst/>
-            </a:prstGeom>
-          </p:spPr>
-        </p:pic>
-        <p:pic>
-          <p:nvPicPr>
-            <p:cNvPr id="5" name="Picture 4"/>
-            <p:cNvPicPr>
-              <a:picLocks noChangeAspect="1"/>
-            </p:cNvPicPr>
-            <p:nvPr/>
-          </p:nvPicPr>
-          <p:blipFill>
-            <a:blip r:embed="rId6" cstate="print">
-              <a:extLst>
-                <a:ext uri="{28A0092B-C50C-407E-A947-70E740481C1C}">
-                  <a14:useLocalDpi xmlns:a14="http://schemas.microsoft.com/office/drawing/2010/main" val="0"/>
-                </a:ext>
-              </a:extLst>
-            </a:blip>
-            <a:stretch>
-              <a:fillRect/>
-            </a:stretch>
-          </p:blipFill>
-          <p:spPr>
-            <a:xfrm>
-              <a:off x="228600" y="4214587"/>
-              <a:ext cx="685800" cy="685800"/>
-            </a:xfrm>
-            <a:prstGeom prst="rect">
-              <a:avLst/>
-            </a:prstGeom>
-          </p:spPr>
-        </p:pic>
-      </p:grpSp>
-    </p:spTree>
-    <p:extLst>
-      <p:ext uri="{BB962C8B-B14F-4D97-AF65-F5344CB8AC3E}">
-        <p14:creationId xmlns:p14="http://schemas.microsoft.com/office/powerpoint/2010/main" val="3231386181"/>
-      </p:ext>
-    </p:extLst>
-  </p:cSld>
-  <p:clrMapOvr>
-    <a:masterClrMapping/>
-  </p:clrMapOvr>
-  <p:timing>
-    <p:tnLst>
-      <p:par>
-        <p:cTn id="1" dur="indefinite" restart="never" nodeType="tmRoot"/>
-      </p:par>
-    </p:tnLst>
-  </p:timing>
-</p:sld>
-</file>
-
-<file path=ppt/slides/slide5.xml><?xml version="1.0" encoding="utf-8"?>
-<p:sld xmlns:a="http://schemas.openxmlformats.org/drawingml/2006/main" xmlns:r="http://schemas.openxmlformats.org/officeDocument/2006/relationships" xmlns:p="http://schemas.openxmlformats.org/presentationml/2006/main">
-  <p:cSld>
-    <p:spTree>
-      <p:nvGrpSpPr>
-        <p:cNvPr id="1" name=""/>
-        <p:cNvGrpSpPr/>
-        <p:nvPr/>
-      </p:nvGrpSpPr>
-      <p:grpSpPr>
-        <a:xfrm>
-          <a:off x="0" y="0"/>
-          <a:ext cx="0" cy="0"/>
-          <a:chOff x="0" y="0"/>
-          <a:chExt cx="0" cy="0"/>
-        </a:xfrm>
-      </p:grpSpPr>
-      <p:sp>
-        <p:nvSpPr>
-          <p:cNvPr id="2" name="Title 1"/>
-          <p:cNvSpPr>
-            <a:spLocks noGrp="1"/>
-          </p:cNvSpPr>
-          <p:nvPr>
-            <p:ph type="title"/>
-          </p:nvPr>
-        </p:nvSpPr>
-        <p:spPr/>
-        <p:txBody>
-          <a:bodyPr>
-            <a:normAutofit/>
-          </a:bodyPr>
-          <a:lstStyle/>
-          <a:p>
-            <a:pPr rtl="1"/>
-            <a:r>
-              <a:rPr lang="fa-IR" sz="2800" b="1" dirty="0" smtClean="0"/>
-              <a:t>سایت </a:t>
-            </a:r>
-            <a:r>
-              <a:rPr lang="en-US" sz="2800" b="1" dirty="0" smtClean="0"/>
-              <a:t>Coursera</a:t>
-            </a:r>
-            <a:endParaRPr lang="fa-IR" sz="2800" b="1" dirty="0"/>
-          </a:p>
-        </p:txBody>
-      </p:sp>
-      <p:sp>
-        <p:nvSpPr>
-          <p:cNvPr id="3" name="Content Placeholder 2"/>
-          <p:cNvSpPr>
-            <a:spLocks noGrp="1"/>
-          </p:cNvSpPr>
-          <p:nvPr>
-            <p:ph idx="1"/>
-          </p:nvPr>
-        </p:nvSpPr>
-        <p:spPr>
-          <a:xfrm>
             <a:off x="762000" y="1340579"/>
             <a:ext cx="7658100" cy="2686050"/>
           </a:xfrm>
@@ -7796,15 +7063,7 @@
                   <a:srgbClr val="002060"/>
                 </a:solidFill>
               </a:rPr>
-              <a:t>شامل 5 دوره آموزشی </a:t>
-            </a:r>
-            <a:r>
-              <a:rPr lang="fa-IR" sz="2400" i="0" dirty="0" smtClean="0">
-                <a:solidFill>
-                  <a:srgbClr val="002060"/>
-                </a:solidFill>
-              </a:rPr>
-              <a:t>مستقل</a:t>
+              <a:t>شامل 5 دوره آموزشی مستقل</a:t>
             </a:r>
           </a:p>
           <a:p>
@@ -7938,7 +7197,7 @@
             <a:fld id="{629637A9-119A-49DA-BD12-AAC58B377D80}" type="slidenum">
               <a:rPr lang="en-US" smtClean="0"/>
               <a:pPr/>
-              <a:t>5</a:t>
+              <a:t>4</a:t>
             </a:fld>
             <a:endParaRPr lang="en-US" dirty="0"/>
           </a:p>
@@ -8038,7 +7297,7 @@
 </p:sld>
 </file>
 
-<file path=ppt/slides/slide6.xml><?xml version="1.0" encoding="utf-8"?>
+<file path=ppt/slides/slide5.xml><?xml version="1.0" encoding="utf-8"?>
 <p:sld xmlns:a="http://schemas.openxmlformats.org/drawingml/2006/main" xmlns:r="http://schemas.openxmlformats.org/officeDocument/2006/relationships" xmlns:p="http://schemas.openxmlformats.org/presentationml/2006/main">
   <p:cSld>
     <p:spTree>
@@ -8237,7 +7496,7 @@
             <a:fld id="{629637A9-119A-49DA-BD12-AAC58B377D80}" type="slidenum">
               <a:rPr lang="en-US" smtClean="0"/>
               <a:pPr/>
-              <a:t>6</a:t>
+              <a:t>5</a:t>
             </a:fld>
             <a:endParaRPr lang="en-US" dirty="0"/>
           </a:p>
@@ -8382,7 +7641,7 @@
 </p:sld>
 </file>
 
-<file path=ppt/slides/slide7.xml><?xml version="1.0" encoding="utf-8"?>
+<file path=ppt/slides/slide6.xml><?xml version="1.0" encoding="utf-8"?>
 <p:sld xmlns:a="http://schemas.openxmlformats.org/drawingml/2006/main" xmlns:r="http://schemas.openxmlformats.org/officeDocument/2006/relationships" xmlns:p="http://schemas.openxmlformats.org/presentationml/2006/main">
   <p:cSld>
     <p:spTree>
@@ -8558,7 +7817,7 @@
             <a:fld id="{629637A9-119A-49DA-BD12-AAC58B377D80}" type="slidenum">
               <a:rPr lang="en-US" smtClean="0"/>
               <a:pPr/>
-              <a:t>7</a:t>
+              <a:t>6</a:t>
             </a:fld>
             <a:endParaRPr lang="en-US" dirty="0"/>
           </a:p>
@@ -8693,7 +7952,7 @@
 </p:sld>
 </file>
 
-<file path=ppt/slides/slide8.xml><?xml version="1.0" encoding="utf-8"?>
+<file path=ppt/slides/slide7.xml><?xml version="1.0" encoding="utf-8"?>
 <p:sld xmlns:a="http://schemas.openxmlformats.org/drawingml/2006/main" xmlns:r="http://schemas.openxmlformats.org/officeDocument/2006/relationships" xmlns:p="http://schemas.openxmlformats.org/presentationml/2006/main">
   <p:cSld>
     <p:spTree>
@@ -8821,7 +8080,7 @@
             <a:fld id="{629637A9-119A-49DA-BD12-AAC58B377D80}" type="slidenum">
               <a:rPr lang="en-US" smtClean="0"/>
               <a:pPr/>
-              <a:t>8</a:t>
+              <a:t>7</a:t>
             </a:fld>
             <a:endParaRPr lang="en-US" dirty="0"/>
           </a:p>
@@ -8966,7 +8225,7 @@
 </p:sld>
 </file>
 
-<file path=ppt/slides/slide9.xml><?xml version="1.0" encoding="utf-8"?>
+<file path=ppt/slides/slide8.xml><?xml version="1.0" encoding="utf-8"?>
 <p:sld xmlns:a="http://schemas.openxmlformats.org/drawingml/2006/main" xmlns:r="http://schemas.openxmlformats.org/officeDocument/2006/relationships" xmlns:p="http://schemas.openxmlformats.org/presentationml/2006/main">
   <p:cSld>
     <p:spTree>
@@ -9071,22 +8330,13 @@
               <a:buNone/>
             </a:pPr>
             <a:r>
-              <a:rPr lang="en-US" sz="2400" dirty="0">
+              <a:rPr lang="en-US" sz="2400" dirty="0" smtClean="0">
                 <a:solidFill>
                   <a:srgbClr val="002060"/>
                 </a:solidFill>
                 <a:hlinkClick r:id="rId2"/>
               </a:rPr>
-              <a:t>http://cs231n.github.io</a:t>
-            </a:r>
-            <a:r>
-              <a:rPr lang="en-US" sz="2400" dirty="0" smtClean="0">
-                <a:solidFill>
-                  <a:srgbClr val="002060"/>
-                </a:solidFill>
-                <a:hlinkClick r:id="rId2"/>
-              </a:rPr>
-              <a:t>/</a:t>
+              <a:t>http://cs231n.stanford.edu/</a:t>
             </a:r>
             <a:endParaRPr lang="en-US" sz="1800" dirty="0" smtClean="0">
               <a:solidFill>
@@ -9149,7 +8399,7 @@
             <a:fld id="{629637A9-119A-49DA-BD12-AAC58B377D80}" type="slidenum">
               <a:rPr lang="en-US" smtClean="0"/>
               <a:pPr/>
-              <a:t>9</a:t>
+              <a:t>8</a:t>
             </a:fld>
             <a:endParaRPr lang="en-US" dirty="0"/>
           </a:p>
@@ -9199,6 +8449,279 @@
     <p:extLst>
       <p:ext uri="{BB962C8B-B14F-4D97-AF65-F5344CB8AC3E}">
         <p14:creationId xmlns:p14="http://schemas.microsoft.com/office/powerpoint/2010/main" val="3182091597"/>
+      </p:ext>
+    </p:extLst>
+  </p:cSld>
+  <p:clrMapOvr>
+    <a:masterClrMapping/>
+  </p:clrMapOvr>
+  <p:timing>
+    <p:tnLst>
+      <p:par>
+        <p:cTn id="1" dur="indefinite" restart="never" nodeType="tmRoot"/>
+      </p:par>
+    </p:tnLst>
+  </p:timing>
+</p:sld>
+</file>
+
+<file path=ppt/slides/slide9.xml><?xml version="1.0" encoding="utf-8"?>
+<p:sld xmlns:a="http://schemas.openxmlformats.org/drawingml/2006/main" xmlns:r="http://schemas.openxmlformats.org/officeDocument/2006/relationships" xmlns:p="http://schemas.openxmlformats.org/presentationml/2006/main">
+  <p:cSld>
+    <p:spTree>
+      <p:nvGrpSpPr>
+        <p:cNvPr id="1" name=""/>
+        <p:cNvGrpSpPr/>
+        <p:nvPr/>
+      </p:nvGrpSpPr>
+      <p:grpSpPr>
+        <a:xfrm>
+          <a:off x="0" y="0"/>
+          <a:ext cx="0" cy="0"/>
+          <a:chOff x="0" y="0"/>
+          <a:chExt cx="0" cy="0"/>
+        </a:xfrm>
+      </p:grpSpPr>
+      <p:sp>
+        <p:nvSpPr>
+          <p:cNvPr id="2" name="Title 1"/>
+          <p:cNvSpPr>
+            <a:spLocks noGrp="1"/>
+          </p:cNvSpPr>
+          <p:nvPr>
+            <p:ph type="title"/>
+          </p:nvPr>
+        </p:nvSpPr>
+        <p:spPr/>
+        <p:txBody>
+          <a:bodyPr>
+            <a:normAutofit/>
+          </a:bodyPr>
+          <a:lstStyle/>
+          <a:p>
+            <a:r>
+              <a:rPr lang="fa-IR" sz="2800" b="1" dirty="0" smtClean="0"/>
+              <a:t>دانشگاه استنفورد</a:t>
+            </a:r>
+            <a:endParaRPr lang="en-US" sz="2800" b="1" dirty="0"/>
+          </a:p>
+        </p:txBody>
+      </p:sp>
+      <p:sp>
+        <p:nvSpPr>
+          <p:cNvPr id="3" name="Content Placeholder 2"/>
+          <p:cNvSpPr>
+            <a:spLocks noGrp="1"/>
+          </p:cNvSpPr>
+          <p:nvPr>
+            <p:ph idx="1"/>
+          </p:nvPr>
+        </p:nvSpPr>
+        <p:spPr/>
+        <p:txBody>
+          <a:bodyPr>
+            <a:normAutofit lnSpcReduction="10000"/>
+          </a:bodyPr>
+          <a:lstStyle/>
+          <a:p>
+            <a:pPr algn="r" rtl="1">
+              <a:lnSpc>
+                <a:spcPct val="150000"/>
+              </a:lnSpc>
+            </a:pPr>
+            <a:r>
+              <a:rPr lang="fa-IR" sz="2800" dirty="0" smtClean="0">
+                <a:solidFill>
+                  <a:srgbClr val="002060"/>
+                </a:solidFill>
+              </a:rPr>
+              <a:t>دوره یادگیری عمیق (</a:t>
+            </a:r>
+            <a:r>
+              <a:rPr lang="en-US" sz="2400" dirty="0">
+                <a:solidFill>
+                  <a:srgbClr val="002060"/>
+                </a:solidFill>
+              </a:rPr>
+              <a:t>Richard </a:t>
+            </a:r>
+            <a:r>
+              <a:rPr lang="en-US" sz="2400" dirty="0" err="1">
+                <a:solidFill>
+                  <a:srgbClr val="002060"/>
+                </a:solidFill>
+              </a:rPr>
+              <a:t>Socher</a:t>
+            </a:r>
+            <a:r>
+              <a:rPr lang="fa-IR" sz="2800" dirty="0" smtClean="0">
+                <a:solidFill>
+                  <a:srgbClr val="002060"/>
+                </a:solidFill>
+              </a:rPr>
+              <a:t>)</a:t>
+            </a:r>
+          </a:p>
+          <a:p>
+            <a:pPr marL="0" indent="0" algn="l" rtl="0">
+              <a:lnSpc>
+                <a:spcPct val="150000"/>
+              </a:lnSpc>
+              <a:buNone/>
+            </a:pPr>
+            <a:r>
+              <a:rPr lang="en-US" sz="2400" dirty="0">
+                <a:solidFill>
+                  <a:srgbClr val="002060"/>
+                </a:solidFill>
+                <a:hlinkClick r:id="rId2"/>
+              </a:rPr>
+              <a:t>https://cs224d.stanford.edu</a:t>
+            </a:r>
+            <a:r>
+              <a:rPr lang="en-US" sz="2400" dirty="0" smtClean="0">
+                <a:solidFill>
+                  <a:srgbClr val="002060"/>
+                </a:solidFill>
+                <a:hlinkClick r:id="rId2"/>
+              </a:rPr>
+              <a:t>/</a:t>
+            </a:r>
+            <a:endParaRPr lang="en-US" sz="2400" dirty="0" smtClean="0">
+              <a:solidFill>
+                <a:srgbClr val="002060"/>
+              </a:solidFill>
+            </a:endParaRPr>
+          </a:p>
+          <a:p>
+            <a:pPr algn="r" rtl="1">
+              <a:lnSpc>
+                <a:spcPct val="150000"/>
+              </a:lnSpc>
+            </a:pPr>
+            <a:r>
+              <a:rPr lang="fa-IR" sz="2400" dirty="0" smtClean="0">
+                <a:solidFill>
+                  <a:srgbClr val="002060"/>
+                </a:solidFill>
+              </a:rPr>
+              <a:t>تمرکز بر پردازش زبان طبیعی (</a:t>
+            </a:r>
+            <a:r>
+              <a:rPr lang="en-US" sz="2000" dirty="0" smtClean="0">
+                <a:solidFill>
+                  <a:srgbClr val="002060"/>
+                </a:solidFill>
+              </a:rPr>
+              <a:t>NLP</a:t>
+            </a:r>
+            <a:r>
+              <a:rPr lang="fa-IR" sz="2400" dirty="0" smtClean="0">
+                <a:solidFill>
+                  <a:srgbClr val="002060"/>
+                </a:solidFill>
+              </a:rPr>
+              <a:t>)</a:t>
+            </a:r>
+          </a:p>
+          <a:p>
+            <a:pPr algn="r" rtl="1">
+              <a:lnSpc>
+                <a:spcPct val="150000"/>
+              </a:lnSpc>
+            </a:pPr>
+            <a:r>
+              <a:rPr lang="fa-IR" sz="2400" dirty="0" smtClean="0">
+                <a:solidFill>
+                  <a:srgbClr val="002060"/>
+                </a:solidFill>
+              </a:rPr>
+              <a:t>آموزش کدنویسی با </a:t>
+            </a:r>
+            <a:r>
+              <a:rPr lang="en-US" sz="2000" dirty="0" err="1" smtClean="0">
+                <a:solidFill>
+                  <a:srgbClr val="002060"/>
+                </a:solidFill>
+              </a:rPr>
+              <a:t>Tensorflow</a:t>
+            </a:r>
+            <a:endParaRPr lang="en-US" sz="2400" dirty="0">
+              <a:solidFill>
+                <a:srgbClr val="002060"/>
+              </a:solidFill>
+            </a:endParaRPr>
+          </a:p>
+        </p:txBody>
+      </p:sp>
+      <p:sp>
+        <p:nvSpPr>
+          <p:cNvPr id="4" name="Slide Number Placeholder 3"/>
+          <p:cNvSpPr>
+            <a:spLocks noGrp="1"/>
+          </p:cNvSpPr>
+          <p:nvPr>
+            <p:ph type="sldNum" sz="quarter" idx="12"/>
+          </p:nvPr>
+        </p:nvSpPr>
+        <p:spPr/>
+        <p:txBody>
+          <a:bodyPr/>
+          <a:lstStyle/>
+          <a:p>
+            <a:fld id="{629637A9-119A-49DA-BD12-AAC58B377D80}" type="slidenum">
+              <a:rPr lang="en-US" smtClean="0"/>
+              <a:pPr/>
+              <a:t>9</a:t>
+            </a:fld>
+            <a:endParaRPr lang="en-US" dirty="0"/>
+          </a:p>
+        </p:txBody>
+      </p:sp>
+      <p:pic>
+        <p:nvPicPr>
+          <p:cNvPr id="7" name="Picture 6"/>
+          <p:cNvPicPr>
+            <a:picLocks noChangeAspect="1"/>
+          </p:cNvPicPr>
+          <p:nvPr/>
+        </p:nvPicPr>
+        <p:blipFill>
+          <a:blip r:embed="rId3" cstate="email">
+            <a:clrChange>
+              <a:clrFrom>
+                <a:srgbClr val="FFFFFF"/>
+              </a:clrFrom>
+              <a:clrTo>
+                <a:srgbClr val="FFFFFF">
+                  <a:alpha val="0"/>
+                </a:srgbClr>
+              </a:clrTo>
+            </a:clrChange>
+            <a:extLst>
+              <a:ext uri="{28A0092B-C50C-407E-A947-70E740481C1C}">
+                <a14:useLocalDpi xmlns:a14="http://schemas.microsoft.com/office/drawing/2010/main"/>
+              </a:ext>
+            </a:extLst>
+          </a:blip>
+          <a:stretch>
+            <a:fillRect/>
+          </a:stretch>
+        </p:blipFill>
+        <p:spPr>
+          <a:xfrm>
+            <a:off x="533400" y="3754078"/>
+            <a:ext cx="2819400" cy="1233488"/>
+          </a:xfrm>
+          <a:prstGeom prst="rect">
+            <a:avLst/>
+          </a:prstGeom>
+        </p:spPr>
+      </p:pic>
+    </p:spTree>
+    <p:extLst>
+      <p:ext uri="{BB962C8B-B14F-4D97-AF65-F5344CB8AC3E}">
+        <p14:creationId xmlns:p14="http://schemas.microsoft.com/office/powerpoint/2010/main" val="2737061400"/>
       </p:ext>
     </p:extLst>
   </p:cSld>

</xml_diff>

<commit_message>
pdf instead of pptx
</commit_message>
<xml_diff>
--- a/DeepLearning-Intro-05.pptx
+++ b/DeepLearning-Intro-05.pptx
@@ -33,12 +33,12 @@
       <p:italic r:id="rId19"/>
     </p:embeddedFont>
     <p:embeddedFont>
-      <p:font typeface="Tahoma" panose="020B0604030504040204" pitchFamily="34" charset="0"/>
+      <p:font typeface="B Nazanin" panose="00000400000000000000" pitchFamily="2" charset="-78"/>
       <p:regular r:id="rId20"/>
       <p:bold r:id="rId21"/>
     </p:embeddedFont>
     <p:embeddedFont>
-      <p:font typeface="B Nazanin" panose="00000400000000000000" pitchFamily="2" charset="-78"/>
+      <p:font typeface="Tahoma" panose="020B0604030504040204" pitchFamily="34" charset="0"/>
       <p:regular r:id="rId22"/>
       <p:bold r:id="rId23"/>
     </p:embeddedFont>
@@ -249,7 +249,7 @@
             <a:fld id="{CF9B6FA1-485B-4096-870B-7A0ABBBA3EAC}" type="datetimeFigureOut">
               <a:rPr lang="en-US" smtClean="0"/>
               <a:pPr/>
-              <a:t>2020-01-06</a:t>
+              <a:t>5/7/2020</a:t>
             </a:fld>
             <a:endParaRPr lang="en-US" dirty="0"/>
           </a:p>
@@ -692,7 +692,7 @@
             <a:fld id="{B3EA30DF-95FD-405E-BFBA-4B9C8B464E32}" type="datetime1">
               <a:rPr lang="en-US" smtClean="0"/>
               <a:pPr/>
-              <a:t>2020-01-06</a:t>
+              <a:t>5/7/2020</a:t>
             </a:fld>
             <a:endParaRPr lang="en-US" dirty="0"/>
           </a:p>
@@ -1024,7 +1024,7 @@
             <a:fld id="{F1C8D616-20C4-4F23-A64C-0691E2A31EAF}" type="datetime1">
               <a:rPr lang="en-US" smtClean="0"/>
               <a:pPr/>
-              <a:t>2020-01-06</a:t>
+              <a:t>5/7/2020</a:t>
             </a:fld>
             <a:endParaRPr lang="en-US" dirty="0"/>
           </a:p>
@@ -1206,7 +1206,7 @@
             <a:fld id="{A972E606-61D9-45EB-AAFD-97F53E94FD31}" type="datetime1">
               <a:rPr lang="en-US" smtClean="0"/>
               <a:pPr/>
-              <a:t>2020-01-06</a:t>
+              <a:t>5/7/2020</a:t>
             </a:fld>
             <a:endParaRPr lang="en-US" dirty="0"/>
           </a:p>
@@ -1555,7 +1555,7 @@
             <a:fld id="{3C06EC05-0FC6-4B3E-A0BB-503147EBAFC7}" type="datetime1">
               <a:rPr lang="en-US" smtClean="0"/>
               <a:pPr/>
-              <a:t>2020-01-06</a:t>
+              <a:t>5/7/2020</a:t>
             </a:fld>
             <a:endParaRPr lang="en-US" dirty="0"/>
           </a:p>
@@ -1841,7 +1841,7 @@
             <a:fld id="{D29DD2DE-8319-4156-9997-5E3FC01F2440}" type="datetime1">
               <a:rPr lang="en-US" smtClean="0"/>
               <a:pPr/>
-              <a:t>2020-01-06</a:t>
+              <a:t>5/7/2020</a:t>
             </a:fld>
             <a:endParaRPr lang="en-US" dirty="0"/>
           </a:p>
@@ -2237,7 +2237,7 @@
             <a:fld id="{34DAEE71-3A41-4514-ACCA-8E63BA20673B}" type="datetime1">
               <a:rPr lang="en-US" smtClean="0"/>
               <a:pPr/>
-              <a:t>2020-01-06</a:t>
+              <a:t>5/7/2020</a:t>
             </a:fld>
             <a:endParaRPr lang="en-US" dirty="0"/>
           </a:p>
@@ -2716,7 +2716,7 @@
             <a:fld id="{43697F31-8722-459B-8A84-F10AFAC348D1}" type="datetime1">
               <a:rPr lang="en-US" smtClean="0"/>
               <a:pPr/>
-              <a:t>2020-01-06</a:t>
+              <a:t>5/7/2020</a:t>
             </a:fld>
             <a:endParaRPr lang="en-US" dirty="0"/>
           </a:p>
@@ -2836,7 +2836,7 @@
             <a:fld id="{A83EA3D9-6F54-4710-8191-92B18C1A907C}" type="datetime1">
               <a:rPr lang="en-US" smtClean="0"/>
               <a:pPr/>
-              <a:t>2020-01-06</a:t>
+              <a:t>5/7/2020</a:t>
             </a:fld>
             <a:endParaRPr lang="en-US" dirty="0"/>
           </a:p>
@@ -2933,7 +2933,7 @@
             <a:fld id="{F6488192-14B8-4647-A12D-F18B5E551158}" type="datetime1">
               <a:rPr lang="en-US" smtClean="0"/>
               <a:pPr/>
-              <a:t>2020-01-06</a:t>
+              <a:t>5/7/2020</a:t>
             </a:fld>
             <a:endParaRPr lang="en-US" dirty="0"/>
           </a:p>
@@ -3281,7 +3281,7 @@
             <a:fld id="{7E2A289E-2E50-48E9-82D6-BDF548121AE1}" type="datetime1">
               <a:rPr lang="en-US" smtClean="0"/>
               <a:pPr/>
-              <a:t>2020-01-06</a:t>
+              <a:t>5/7/2020</a:t>
             </a:fld>
             <a:endParaRPr lang="en-US" dirty="0"/>
           </a:p>
@@ -3683,7 +3683,7 @@
             <a:fld id="{9CA9AB57-7A2D-495B-A8DE-4CAD9D13607C}" type="datetime1">
               <a:rPr lang="en-US" smtClean="0"/>
               <a:pPr/>
-              <a:t>2020-01-06</a:t>
+              <a:t>5/7/2020</a:t>
             </a:fld>
             <a:endParaRPr lang="en-US" dirty="0"/>
           </a:p>
@@ -3964,7 +3964,7 @@
             <a:fld id="{3C8A2DE5-286A-48A8-AD5B-867309DD8C54}" type="datetime1">
               <a:rPr lang="en-US" smtClean="0"/>
               <a:pPr defTabSz="457200"/>
-              <a:t>2020-01-06</a:t>
+              <a:t>5/7/2020</a:t>
             </a:fld>
             <a:endParaRPr lang="en-US" dirty="0"/>
           </a:p>
@@ -4482,111 +4482,6 @@
       </p:grpSpPr>
       <p:sp>
         <p:nvSpPr>
-          <p:cNvPr id="2" name="Title 1"/>
-          <p:cNvSpPr>
-            <a:spLocks noGrp="1"/>
-          </p:cNvSpPr>
-          <p:nvPr>
-            <p:ph type="ctrTitle"/>
-          </p:nvPr>
-        </p:nvSpPr>
-        <p:spPr>
-          <a:xfrm>
-            <a:off x="758328" y="4052601"/>
-            <a:ext cx="7772400" cy="505330"/>
-          </a:xfrm>
-        </p:spPr>
-        <p:txBody>
-          <a:bodyPr>
-            <a:normAutofit fontScale="90000"/>
-          </a:bodyPr>
-          <a:lstStyle/>
-          <a:p>
-            <a:pPr rtl="1"/>
-            <a:r>
-              <a:rPr lang="fa-IR" sz="2000" b="1" dirty="0" smtClean="0">
-                <a:solidFill>
-                  <a:schemeClr val="bg2">
-                    <a:lumMod val="10000"/>
-                  </a:schemeClr>
-                </a:solidFill>
-              </a:rPr>
-              <a:t/>
-            </a:r>
-            <a:br>
-              <a:rPr lang="fa-IR" sz="2000" b="1" dirty="0" smtClean="0">
-                <a:solidFill>
-                  <a:schemeClr val="bg2">
-                    <a:lumMod val="10000"/>
-                  </a:schemeClr>
-                </a:solidFill>
-              </a:rPr>
-            </a:br>
-            <a:r>
-              <a:rPr lang="fa-IR" sz="1400" b="1" dirty="0" smtClean="0">
-                <a:solidFill>
-                  <a:srgbClr val="002060"/>
-                </a:solidFill>
-                <a:cs typeface="B Mitra" panose="00000400000000000000" pitchFamily="2" charset="-78"/>
-              </a:rPr>
-              <a:t>سعید محققی</a:t>
-            </a:r>
-            <a:r>
-              <a:rPr lang="en-US" sz="1200" b="1" dirty="0">
-                <a:solidFill>
-                  <a:srgbClr val="002060"/>
-                </a:solidFill>
-                <a:cs typeface="B Mitra" panose="00000400000000000000" pitchFamily="2" charset="-78"/>
-              </a:rPr>
-              <a:t> </a:t>
-            </a:r>
-            <a:r>
-              <a:rPr lang="en-US" sz="1200" b="1" dirty="0" smtClean="0">
-                <a:solidFill>
-                  <a:srgbClr val="002060"/>
-                </a:solidFill>
-                <a:cs typeface="B Mitra" panose="00000400000000000000" pitchFamily="2" charset="-78"/>
-              </a:rPr>
-              <a:t>/ </a:t>
-            </a:r>
-            <a:r>
-              <a:rPr lang="fa-IR" sz="1200" b="1" dirty="0" smtClean="0">
-                <a:solidFill>
-                  <a:srgbClr val="002060"/>
-                </a:solidFill>
-                <a:cs typeface="B Mitra" panose="00000400000000000000" pitchFamily="2" charset="-78"/>
-              </a:rPr>
-              <a:t>دانشگاه شاهد</a:t>
-            </a:r>
-            <a:r>
-              <a:rPr lang="en-US" sz="1200" b="1" dirty="0" smtClean="0">
-                <a:solidFill>
-                  <a:srgbClr val="002060"/>
-                </a:solidFill>
-                <a:cs typeface="B Mitra" panose="00000400000000000000" pitchFamily="2" charset="-78"/>
-              </a:rPr>
-              <a:t> / </a:t>
-            </a:r>
-            <a:r>
-              <a:rPr lang="fa-IR" sz="1200" b="1" dirty="0" smtClean="0">
-                <a:solidFill>
-                  <a:srgbClr val="002060"/>
-                </a:solidFill>
-                <a:cs typeface="B Mitra" panose="00000400000000000000" pitchFamily="2" charset="-78"/>
-              </a:rPr>
-              <a:t>زمستان 1398</a:t>
-            </a:r>
-            <a:endParaRPr lang="en-US" sz="1200" b="1" dirty="0">
-              <a:solidFill>
-                <a:srgbClr val="002060"/>
-              </a:solidFill>
-              <a:cs typeface="B Mitra" panose="00000400000000000000" pitchFamily="2" charset="-78"/>
-            </a:endParaRPr>
-          </a:p>
-        </p:txBody>
-      </p:sp>
-      <p:sp>
-        <p:nvSpPr>
           <p:cNvPr id="5" name="Slide Number Placeholder 4"/>
           <p:cNvSpPr>
             <a:spLocks noGrp="1"/>
@@ -4746,6 +4641,121 @@
                 <a:schemeClr val="accent1">
                   <a:lumMod val="75000"/>
                 </a:schemeClr>
+              </a:solidFill>
+              <a:cs typeface="B Mitra" panose="00000400000000000000" pitchFamily="2" charset="-78"/>
+            </a:endParaRPr>
+          </a:p>
+        </p:txBody>
+      </p:sp>
+      <p:sp>
+        <p:nvSpPr>
+          <p:cNvPr id="7" name="Title 1"/>
+          <p:cNvSpPr txBox="1">
+            <a:spLocks/>
+          </p:cNvSpPr>
+          <p:nvPr/>
+        </p:nvSpPr>
+        <p:spPr>
+          <a:xfrm>
+            <a:off x="758328" y="4052601"/>
+            <a:ext cx="7772400" cy="505330"/>
+          </a:xfrm>
+          <a:prstGeom prst="rect">
+            <a:avLst/>
+          </a:prstGeom>
+        </p:spPr>
+        <p:txBody>
+          <a:bodyPr vert="horz" lIns="91440" tIns="45720" rIns="91440" bIns="45720" rtlCol="0" anchor="b">
+            <a:normAutofit fontScale="90000" lnSpcReduction="10000"/>
+          </a:bodyPr>
+          <a:lstStyle>
+            <a:lvl1pPr algn="ctr" defTabSz="685800" rtl="0" eaLnBrk="1" latinLnBrk="0" hangingPunct="1">
+              <a:lnSpc>
+                <a:spcPct val="89000"/>
+              </a:lnSpc>
+              <a:spcBef>
+                <a:spcPct val="0"/>
+              </a:spcBef>
+              <a:buNone/>
+              <a:defRPr sz="5400" kern="1200" cap="all" baseline="0">
+                <a:solidFill>
+                  <a:schemeClr val="tx2"/>
+                </a:solidFill>
+                <a:latin typeface="+mj-lt"/>
+                <a:ea typeface="+mj-ea"/>
+                <a:cs typeface="+mj-cs"/>
+              </a:defRPr>
+            </a:lvl1pPr>
+          </a:lstStyle>
+          <a:p>
+            <a:pPr rtl="1"/>
+            <a:r>
+              <a:rPr lang="fa-IR" sz="2000" b="1" smtClean="0">
+                <a:solidFill>
+                  <a:schemeClr val="bg2">
+                    <a:lumMod val="10000"/>
+                  </a:schemeClr>
+                </a:solidFill>
+              </a:rPr>
+              <a:t/>
+            </a:r>
+            <a:br>
+              <a:rPr lang="fa-IR" sz="2000" b="1" smtClean="0">
+                <a:solidFill>
+                  <a:schemeClr val="bg2">
+                    <a:lumMod val="10000"/>
+                  </a:schemeClr>
+                </a:solidFill>
+              </a:rPr>
+            </a:br>
+            <a:r>
+              <a:rPr lang="fa-IR" sz="1400" b="1" smtClean="0">
+                <a:solidFill>
+                  <a:srgbClr val="002060"/>
+                </a:solidFill>
+                <a:cs typeface="B Mitra" panose="00000400000000000000" pitchFamily="2" charset="-78"/>
+              </a:rPr>
+              <a:t>سعید محققی</a:t>
+            </a:r>
+            <a:r>
+              <a:rPr lang="en-US" sz="1200" b="1" smtClean="0">
+                <a:solidFill>
+                  <a:srgbClr val="002060"/>
+                </a:solidFill>
+                <a:cs typeface="B Mitra" panose="00000400000000000000" pitchFamily="2" charset="-78"/>
+              </a:rPr>
+              <a:t> / </a:t>
+            </a:r>
+            <a:r>
+              <a:rPr lang="fa-IR" sz="1200" b="1" smtClean="0">
+                <a:solidFill>
+                  <a:srgbClr val="002060"/>
+                </a:solidFill>
+                <a:cs typeface="B Mitra" panose="00000400000000000000" pitchFamily="2" charset="-78"/>
+              </a:rPr>
+              <a:t>دانشگاه شاهد</a:t>
+            </a:r>
+            <a:r>
+              <a:rPr lang="en-US" sz="1200" b="1" smtClean="0">
+                <a:solidFill>
+                  <a:srgbClr val="002060"/>
+                </a:solidFill>
+                <a:cs typeface="B Mitra" panose="00000400000000000000" pitchFamily="2" charset="-78"/>
+              </a:rPr>
+              <a:t> / </a:t>
+            </a:r>
+            <a:r>
+              <a:rPr lang="fa-IR" sz="1200" b="1" smtClean="0">
+                <a:solidFill>
+                  <a:srgbClr val="002060"/>
+                </a:solidFill>
+                <a:cs typeface="B Mitra" panose="00000400000000000000" pitchFamily="2" charset="-78"/>
+              </a:rPr>
+              <a:t>99 - 1398</a:t>
+            </a:r>
+            <a:endParaRPr lang="en-US" sz="1200" b="1" dirty="0">
+              <a:solidFill>
+                <a:srgbClr val="002060"/>
               </a:solidFill>
               <a:cs typeface="B Mitra" panose="00000400000000000000" pitchFamily="2" charset="-78"/>
             </a:endParaRPr>

</xml_diff>